<commit_message>
Adicionados os nomes no ppt
</commit_message>
<xml_diff>
--- a/Projeto Analítico.pptx
+++ b/Projeto Analítico.pptx
@@ -3401,7 +3401,7 @@
           <a:p>
             <a:fld id="{95C1AB58-5510-4785-91F7-FEC97DA0A058}" type="datetimeFigureOut">
               <a:rPr lang="pt-BR" smtClean="0"/>
-              <a:t>19/05/2020</a:t>
+              <a:t>25/05/2020</a:t>
             </a:fld>
             <a:endParaRPr lang="pt-BR"/>
           </a:p>
@@ -4214,7 +4214,7 @@
           <a:p>
             <a:fld id="{39A815ED-E26A-4539-B5CA-073B1B83A51C}" type="datetimeFigureOut">
               <a:rPr lang="pt-BR" smtClean="0"/>
-              <a:t>19/05/2020</a:t>
+              <a:t>25/05/2020</a:t>
             </a:fld>
             <a:endParaRPr lang="pt-BR"/>
           </a:p>
@@ -4422,7 +4422,7 @@
           <a:p>
             <a:fld id="{39A815ED-E26A-4539-B5CA-073B1B83A51C}" type="datetimeFigureOut">
               <a:rPr lang="pt-BR" smtClean="0"/>
-              <a:t>19/05/2020</a:t>
+              <a:t>25/05/2020</a:t>
             </a:fld>
             <a:endParaRPr lang="pt-BR"/>
           </a:p>
@@ -4678,7 +4678,7 @@
           <a:p>
             <a:fld id="{39A815ED-E26A-4539-B5CA-073B1B83A51C}" type="datetimeFigureOut">
               <a:rPr lang="pt-BR" smtClean="0"/>
-              <a:t>19/05/2020</a:t>
+              <a:t>25/05/2020</a:t>
             </a:fld>
             <a:endParaRPr lang="pt-BR"/>
           </a:p>
@@ -4852,7 +4852,7 @@
           <a:p>
             <a:fld id="{39A815ED-E26A-4539-B5CA-073B1B83A51C}" type="datetimeFigureOut">
               <a:rPr lang="pt-BR" smtClean="0"/>
-              <a:t>19/05/2020</a:t>
+              <a:t>25/05/2020</a:t>
             </a:fld>
             <a:endParaRPr lang="pt-BR"/>
           </a:p>
@@ -5195,7 +5195,7 @@
           <a:p>
             <a:fld id="{39A815ED-E26A-4539-B5CA-073B1B83A51C}" type="datetimeFigureOut">
               <a:rPr lang="pt-BR" smtClean="0"/>
-              <a:t>19/05/2020</a:t>
+              <a:t>25/05/2020</a:t>
             </a:fld>
             <a:endParaRPr lang="pt-BR"/>
           </a:p>
@@ -5470,7 +5470,7 @@
           <a:p>
             <a:fld id="{39A815ED-E26A-4539-B5CA-073B1B83A51C}" type="datetimeFigureOut">
               <a:rPr lang="pt-BR" smtClean="0"/>
-              <a:t>19/05/2020</a:t>
+              <a:t>25/05/2020</a:t>
             </a:fld>
             <a:endParaRPr lang="pt-BR"/>
           </a:p>
@@ -5849,7 +5849,7 @@
           <a:p>
             <a:fld id="{39A815ED-E26A-4539-B5CA-073B1B83A51C}" type="datetimeFigureOut">
               <a:rPr lang="pt-BR" smtClean="0"/>
-              <a:t>19/05/2020</a:t>
+              <a:t>25/05/2020</a:t>
             </a:fld>
             <a:endParaRPr lang="pt-BR"/>
           </a:p>
@@ -5967,7 +5967,7 @@
           <a:p>
             <a:fld id="{39A815ED-E26A-4539-B5CA-073B1B83A51C}" type="datetimeFigureOut">
               <a:rPr lang="pt-BR" smtClean="0"/>
-              <a:t>19/05/2020</a:t>
+              <a:t>25/05/2020</a:t>
             </a:fld>
             <a:endParaRPr lang="pt-BR"/>
           </a:p>
@@ -6138,7 +6138,7 @@
           <a:p>
             <a:fld id="{39A815ED-E26A-4539-B5CA-073B1B83A51C}" type="datetimeFigureOut">
               <a:rPr lang="pt-BR" smtClean="0"/>
-              <a:t>19/05/2020</a:t>
+              <a:t>25/05/2020</a:t>
             </a:fld>
             <a:endParaRPr lang="pt-BR"/>
           </a:p>
@@ -6492,7 +6492,7 @@
           <a:p>
             <a:fld id="{39A815ED-E26A-4539-B5CA-073B1B83A51C}" type="datetimeFigureOut">
               <a:rPr lang="pt-BR" smtClean="0"/>
-              <a:t>19/05/2020</a:t>
+              <a:t>25/05/2020</a:t>
             </a:fld>
             <a:endParaRPr lang="pt-BR"/>
           </a:p>
@@ -6874,7 +6874,7 @@
           <a:p>
             <a:fld id="{39A815ED-E26A-4539-B5CA-073B1B83A51C}" type="datetimeFigureOut">
               <a:rPr lang="pt-BR" smtClean="0"/>
-              <a:t>19/05/2020</a:t>
+              <a:t>25/05/2020</a:t>
             </a:fld>
             <a:endParaRPr lang="pt-BR"/>
           </a:p>
@@ -7161,7 +7161,7 @@
           <a:p>
             <a:fld id="{39A815ED-E26A-4539-B5CA-073B1B83A51C}" type="datetimeFigureOut">
               <a:rPr lang="pt-BR" smtClean="0"/>
-              <a:t>19/05/2020</a:t>
+              <a:t>25/05/2020</a:t>
             </a:fld>
             <a:endParaRPr lang="pt-BR"/>
           </a:p>
@@ -7756,6 +7756,63 @@
           </a:prstGeom>
         </p:spPr>
       </p:pic>
+      <p:sp>
+        <p:nvSpPr>
+          <p:cNvPr id="3" name="CaixaDeTexto 2">
+            <a:extLst>
+              <a:ext uri="{FF2B5EF4-FFF2-40B4-BE49-F238E27FC236}">
+                <a16:creationId xmlns:a16="http://schemas.microsoft.com/office/drawing/2014/main" id="{C4BD5EE8-327C-4AA6-AF06-8121E77D6DE7}"/>
+              </a:ext>
+            </a:extLst>
+          </p:cNvPr>
+          <p:cNvSpPr txBox="1"/>
+          <p:nvPr/>
+        </p:nvSpPr>
+        <p:spPr>
+          <a:xfrm>
+            <a:off x="1184988" y="4562669"/>
+            <a:ext cx="3200400" cy="1200329"/>
+          </a:xfrm>
+          <a:prstGeom prst="rect">
+            <a:avLst/>
+          </a:prstGeom>
+          <a:noFill/>
+        </p:spPr>
+        <p:txBody>
+          <a:bodyPr wrap="square" rtlCol="0">
+            <a:spAutoFit/>
+          </a:bodyPr>
+          <a:lstStyle/>
+          <a:p>
+            <a:r>
+              <a:rPr lang="pt-BR" dirty="0"/>
+              <a:t>Afonso Machado</a:t>
+            </a:r>
+          </a:p>
+          <a:p>
+            <a:r>
+              <a:rPr lang="pt-BR" dirty="0" err="1"/>
+              <a:t>Áquila</a:t>
+            </a:r>
+            <a:r>
+              <a:rPr lang="pt-BR" dirty="0"/>
+              <a:t> Estevão</a:t>
+            </a:r>
+          </a:p>
+          <a:p>
+            <a:r>
+              <a:rPr lang="pt-BR" dirty="0"/>
+              <a:t>Felipe Gontijo</a:t>
+            </a:r>
+          </a:p>
+          <a:p>
+            <a:r>
+              <a:rPr lang="pt-BR" dirty="0"/>
+              <a:t>Marcos Bezerra</a:t>
+            </a:r>
+          </a:p>
+        </p:txBody>
+      </p:sp>
     </p:spTree>
     <p:extLst>
       <p:ext uri="{BB962C8B-B14F-4D97-AF65-F5344CB8AC3E}">

</xml_diff>